<commit_message>
Made progress on tech review
</commit_message>
<xml_diff>
--- a/src/ReturnsWeb/ReturnsWebImages.pptx
+++ b/src/ReturnsWeb/ReturnsWebImages.pptx
@@ -12,6 +12,8 @@
     <p:sldId id="261" r:id="rId6"/>
     <p:sldId id="259" r:id="rId7"/>
     <p:sldId id="262" r:id="rId8"/>
+    <p:sldId id="263" r:id="rId9"/>
+    <p:sldId id="264" r:id="rId10"/>
   </p:sldIdLst>
   <p:sldSz cx="12192000" cy="6858000"/>
   <p:notesSz cx="6858000" cy="9144000"/>
@@ -118,6 +120,10 @@
 </p:presentation>
 </file>
 
+<file path=ppt/revisionInfo.xml><?xml version="1.0" encoding="utf-8"?>
+<p1510:revInfo xmlns:a="http://schemas.openxmlformats.org/drawingml/2006/main" xmlns:r="http://schemas.openxmlformats.org/officeDocument/2006/relationships" xmlns:p1510="http://schemas.microsoft.com/office/powerpoint/2015/10/main"/>
+</file>
+
 <file path=ppt/slideLayouts/slideLayout1.xml><?xml version="1.0" encoding="utf-8"?>
 <p:sldLayout xmlns:a="http://schemas.openxmlformats.org/drawingml/2006/main" xmlns:r="http://schemas.openxmlformats.org/officeDocument/2006/relationships" xmlns:p="http://schemas.openxmlformats.org/presentationml/2006/main" type="title" preserve="1">
   <p:cSld name="Title Slide">
@@ -265,7 +271,7 @@
           <a:p>
             <a:fld id="{80773548-7B84-4842-8203-FD17AA895A9A}" type="datetimeFigureOut">
               <a:rPr lang="en-US" smtClean="0"/>
-              <a:t>7/8/2018</a:t>
+              <a:t>7/9/2018</a:t>
             </a:fld>
             <a:endParaRPr lang="en-US"/>
           </a:p>
@@ -463,7 +469,7 @@
           <a:p>
             <a:fld id="{80773548-7B84-4842-8203-FD17AA895A9A}" type="datetimeFigureOut">
               <a:rPr lang="en-US" smtClean="0"/>
-              <a:t>7/8/2018</a:t>
+              <a:t>7/9/2018</a:t>
             </a:fld>
             <a:endParaRPr lang="en-US"/>
           </a:p>
@@ -671,7 +677,7 @@
           <a:p>
             <a:fld id="{80773548-7B84-4842-8203-FD17AA895A9A}" type="datetimeFigureOut">
               <a:rPr lang="en-US" smtClean="0"/>
-              <a:t>7/8/2018</a:t>
+              <a:t>7/9/2018</a:t>
             </a:fld>
             <a:endParaRPr lang="en-US"/>
           </a:p>
@@ -869,7 +875,7 @@
           <a:p>
             <a:fld id="{80773548-7B84-4842-8203-FD17AA895A9A}" type="datetimeFigureOut">
               <a:rPr lang="en-US" smtClean="0"/>
-              <a:t>7/8/2018</a:t>
+              <a:t>7/9/2018</a:t>
             </a:fld>
             <a:endParaRPr lang="en-US"/>
           </a:p>
@@ -1144,7 +1150,7 @@
           <a:p>
             <a:fld id="{80773548-7B84-4842-8203-FD17AA895A9A}" type="datetimeFigureOut">
               <a:rPr lang="en-US" smtClean="0"/>
-              <a:t>7/8/2018</a:t>
+              <a:t>7/9/2018</a:t>
             </a:fld>
             <a:endParaRPr lang="en-US"/>
           </a:p>
@@ -1409,7 +1415,7 @@
           <a:p>
             <a:fld id="{80773548-7B84-4842-8203-FD17AA895A9A}" type="datetimeFigureOut">
               <a:rPr lang="en-US" smtClean="0"/>
-              <a:t>7/8/2018</a:t>
+              <a:t>7/9/2018</a:t>
             </a:fld>
             <a:endParaRPr lang="en-US"/>
           </a:p>
@@ -1821,7 +1827,7 @@
           <a:p>
             <a:fld id="{80773548-7B84-4842-8203-FD17AA895A9A}" type="datetimeFigureOut">
               <a:rPr lang="en-US" smtClean="0"/>
-              <a:t>7/8/2018</a:t>
+              <a:t>7/9/2018</a:t>
             </a:fld>
             <a:endParaRPr lang="en-US"/>
           </a:p>
@@ -1962,7 +1968,7 @@
           <a:p>
             <a:fld id="{80773548-7B84-4842-8203-FD17AA895A9A}" type="datetimeFigureOut">
               <a:rPr lang="en-US" smtClean="0"/>
-              <a:t>7/8/2018</a:t>
+              <a:t>7/9/2018</a:t>
             </a:fld>
             <a:endParaRPr lang="en-US"/>
           </a:p>
@@ -2075,7 +2081,7 @@
           <a:p>
             <a:fld id="{80773548-7B84-4842-8203-FD17AA895A9A}" type="datetimeFigureOut">
               <a:rPr lang="en-US" smtClean="0"/>
-              <a:t>7/8/2018</a:t>
+              <a:t>7/9/2018</a:t>
             </a:fld>
             <a:endParaRPr lang="en-US"/>
           </a:p>
@@ -2386,7 +2392,7 @@
           <a:p>
             <a:fld id="{80773548-7B84-4842-8203-FD17AA895A9A}" type="datetimeFigureOut">
               <a:rPr lang="en-US" smtClean="0"/>
-              <a:t>7/8/2018</a:t>
+              <a:t>7/9/2018</a:t>
             </a:fld>
             <a:endParaRPr lang="en-US"/>
           </a:p>
@@ -2674,7 +2680,7 @@
           <a:p>
             <a:fld id="{80773548-7B84-4842-8203-FD17AA895A9A}" type="datetimeFigureOut">
               <a:rPr lang="en-US" smtClean="0"/>
-              <a:t>7/8/2018</a:t>
+              <a:t>7/9/2018</a:t>
             </a:fld>
             <a:endParaRPr lang="en-US"/>
           </a:p>
@@ -2915,7 +2921,7 @@
           <a:p>
             <a:fld id="{80773548-7B84-4842-8203-FD17AA895A9A}" type="datetimeFigureOut">
               <a:rPr lang="en-US" smtClean="0"/>
-              <a:t>7/8/2018</a:t>
+              <a:t>7/9/2018</a:t>
             </a:fld>
             <a:endParaRPr lang="en-US"/>
           </a:p>
@@ -8125,6 +8131,950 @@
 </p:sld>
 </file>
 
+<file path=ppt/slides/slide8.xml><?xml version="1.0" encoding="utf-8"?>
+<p:sld xmlns:a="http://schemas.openxmlformats.org/drawingml/2006/main" xmlns:r="http://schemas.openxmlformats.org/officeDocument/2006/relationships" xmlns:p="http://schemas.openxmlformats.org/presentationml/2006/main">
+  <p:cSld>
+    <p:spTree>
+      <p:nvGrpSpPr>
+        <p:cNvPr id="1" name=""/>
+        <p:cNvGrpSpPr/>
+        <p:nvPr/>
+      </p:nvGrpSpPr>
+      <p:grpSpPr>
+        <a:xfrm>
+          <a:off x="0" y="0"/>
+          <a:ext cx="0" cy="0"/>
+          <a:chOff x="0" y="0"/>
+          <a:chExt cx="0" cy="0"/>
+        </a:xfrm>
+      </p:grpSpPr>
+      <p:sp>
+        <p:nvSpPr>
+          <p:cNvPr id="4" name="TextBox 3">
+            <a:extLst>
+              <a:ext uri="{FF2B5EF4-FFF2-40B4-BE49-F238E27FC236}">
+                <a16:creationId xmlns:a16="http://schemas.microsoft.com/office/drawing/2014/main" id="{89F9381B-E906-4A95-9C09-8E1149D98BFB}"/>
+              </a:ext>
+            </a:extLst>
+          </p:cNvPr>
+          <p:cNvSpPr txBox="1"/>
+          <p:nvPr/>
+        </p:nvSpPr>
+        <p:spPr>
+          <a:xfrm>
+            <a:off x="466531" y="559837"/>
+            <a:ext cx="2207336" cy="369332"/>
+          </a:xfrm>
+          <a:prstGeom prst="rect">
+            <a:avLst/>
+          </a:prstGeom>
+          <a:noFill/>
+        </p:spPr>
+        <p:txBody>
+          <a:bodyPr wrap="none" rtlCol="0">
+            <a:spAutoFit/>
+          </a:bodyPr>
+          <a:lstStyle/>
+          <a:p>
+            <a:r>
+              <a:rPr lang="en-US" dirty="0"/>
+              <a:t>End Point per Caller 1</a:t>
+            </a:r>
+          </a:p>
+        </p:txBody>
+      </p:sp>
+      <p:sp>
+        <p:nvSpPr>
+          <p:cNvPr id="17" name="Isosceles Triangle 16">
+            <a:extLst>
+              <a:ext uri="{FF2B5EF4-FFF2-40B4-BE49-F238E27FC236}">
+                <a16:creationId xmlns:a16="http://schemas.microsoft.com/office/drawing/2014/main" id="{213796AE-41C2-4B8C-8203-7D62167C8D96}"/>
+              </a:ext>
+            </a:extLst>
+          </p:cNvPr>
+          <p:cNvSpPr/>
+          <p:nvPr/>
+        </p:nvSpPr>
+        <p:spPr>
+          <a:xfrm>
+            <a:off x="4005942" y="3010677"/>
+            <a:ext cx="2837795" cy="1959429"/>
+          </a:xfrm>
+          <a:prstGeom prst="triangle">
+            <a:avLst/>
+          </a:prstGeom>
+        </p:spPr>
+        <p:style>
+          <a:lnRef idx="1">
+            <a:schemeClr val="accent3"/>
+          </a:lnRef>
+          <a:fillRef idx="2">
+            <a:schemeClr val="accent3"/>
+          </a:fillRef>
+          <a:effectRef idx="1">
+            <a:schemeClr val="accent3"/>
+          </a:effectRef>
+          <a:fontRef idx="minor">
+            <a:schemeClr val="dk1"/>
+          </a:fontRef>
+        </p:style>
+        <p:txBody>
+          <a:bodyPr rtlCol="0" anchor="ctr"/>
+          <a:lstStyle/>
+          <a:p>
+            <a:pPr algn="ctr"/>
+            <a:r>
+              <a:rPr lang="en-US" dirty="0"/>
+              <a:t>Returns </a:t>
+            </a:r>
+            <a:r>
+              <a:rPr lang="en-US" dirty="0" err="1"/>
+              <a:t>Calc</a:t>
+            </a:r>
+            <a:endParaRPr lang="en-US" dirty="0"/>
+          </a:p>
+        </p:txBody>
+      </p:sp>
+      <p:sp>
+        <p:nvSpPr>
+          <p:cNvPr id="18" name="Arrow: Right 17">
+            <a:extLst>
+              <a:ext uri="{FF2B5EF4-FFF2-40B4-BE49-F238E27FC236}">
+                <a16:creationId xmlns:a16="http://schemas.microsoft.com/office/drawing/2014/main" id="{5E098D36-B593-4BF7-93DE-E0D9920EB8F6}"/>
+              </a:ext>
+            </a:extLst>
+          </p:cNvPr>
+          <p:cNvSpPr/>
+          <p:nvPr/>
+        </p:nvSpPr>
+        <p:spPr>
+          <a:xfrm>
+            <a:off x="5685455" y="3318588"/>
+            <a:ext cx="457200" cy="214604"/>
+          </a:xfrm>
+          <a:prstGeom prst="rightArrow">
+            <a:avLst/>
+          </a:prstGeom>
+        </p:spPr>
+        <p:style>
+          <a:lnRef idx="3">
+            <a:schemeClr val="lt1"/>
+          </a:lnRef>
+          <a:fillRef idx="1">
+            <a:schemeClr val="dk1"/>
+          </a:fillRef>
+          <a:effectRef idx="1">
+            <a:schemeClr val="dk1"/>
+          </a:effectRef>
+          <a:fontRef idx="minor">
+            <a:schemeClr val="lt1"/>
+          </a:fontRef>
+        </p:style>
+        <p:txBody>
+          <a:bodyPr rtlCol="0" anchor="ctr"/>
+          <a:lstStyle/>
+          <a:p>
+            <a:pPr algn="ctr"/>
+            <a:endParaRPr lang="en-US"/>
+          </a:p>
+        </p:txBody>
+      </p:sp>
+      <p:sp>
+        <p:nvSpPr>
+          <p:cNvPr id="15" name="Rectangle 14">
+            <a:extLst>
+              <a:ext uri="{FF2B5EF4-FFF2-40B4-BE49-F238E27FC236}">
+                <a16:creationId xmlns:a16="http://schemas.microsoft.com/office/drawing/2014/main" id="{2889C6CD-D751-4444-ABD7-4A017E89426D}"/>
+              </a:ext>
+            </a:extLst>
+          </p:cNvPr>
+          <p:cNvSpPr/>
+          <p:nvPr/>
+        </p:nvSpPr>
+        <p:spPr>
+          <a:xfrm>
+            <a:off x="8196678" y="2596241"/>
+            <a:ext cx="1710931" cy="501522"/>
+          </a:xfrm>
+          <a:prstGeom prst="rect">
+            <a:avLst/>
+          </a:prstGeom>
+          <a:ln/>
+        </p:spPr>
+        <p:style>
+          <a:lnRef idx="1">
+            <a:schemeClr val="accent2"/>
+          </a:lnRef>
+          <a:fillRef idx="2">
+            <a:schemeClr val="accent2"/>
+          </a:fillRef>
+          <a:effectRef idx="1">
+            <a:schemeClr val="accent2"/>
+          </a:effectRef>
+          <a:fontRef idx="minor">
+            <a:schemeClr val="dk1"/>
+          </a:fontRef>
+        </p:style>
+        <p:txBody>
+          <a:bodyPr rtlCol="0" anchor="ctr"/>
+          <a:lstStyle/>
+          <a:p>
+            <a:pPr algn="ctr"/>
+            <a:r>
+              <a:rPr lang="en-US" dirty="0"/>
+              <a:t>Report Center</a:t>
+            </a:r>
+          </a:p>
+        </p:txBody>
+      </p:sp>
+      <p:sp>
+        <p:nvSpPr>
+          <p:cNvPr id="16" name="Rectangle 15">
+            <a:extLst>
+              <a:ext uri="{FF2B5EF4-FFF2-40B4-BE49-F238E27FC236}">
+                <a16:creationId xmlns:a16="http://schemas.microsoft.com/office/drawing/2014/main" id="{75060587-DF65-46C3-ABAB-126CA1091DD0}"/>
+              </a:ext>
+            </a:extLst>
+          </p:cNvPr>
+          <p:cNvSpPr/>
+          <p:nvPr/>
+        </p:nvSpPr>
+        <p:spPr>
+          <a:xfrm>
+            <a:off x="8196678" y="3191069"/>
+            <a:ext cx="1710931" cy="501522"/>
+          </a:xfrm>
+          <a:prstGeom prst="rect">
+            <a:avLst/>
+          </a:prstGeom>
+          <a:ln/>
+        </p:spPr>
+        <p:style>
+          <a:lnRef idx="1">
+            <a:schemeClr val="accent2"/>
+          </a:lnRef>
+          <a:fillRef idx="2">
+            <a:schemeClr val="accent2"/>
+          </a:fillRef>
+          <a:effectRef idx="1">
+            <a:schemeClr val="accent2"/>
+          </a:effectRef>
+          <a:fontRef idx="minor">
+            <a:schemeClr val="dk1"/>
+          </a:fontRef>
+        </p:style>
+        <p:txBody>
+          <a:bodyPr rtlCol="0" anchor="ctr"/>
+          <a:lstStyle/>
+          <a:p>
+            <a:pPr algn="ctr"/>
+            <a:r>
+              <a:rPr lang="en-US" dirty="0"/>
+              <a:t>GIPS</a:t>
+            </a:r>
+          </a:p>
+        </p:txBody>
+      </p:sp>
+      <p:sp>
+        <p:nvSpPr>
+          <p:cNvPr id="21" name="Rectangle 20">
+            <a:extLst>
+              <a:ext uri="{FF2B5EF4-FFF2-40B4-BE49-F238E27FC236}">
+                <a16:creationId xmlns:a16="http://schemas.microsoft.com/office/drawing/2014/main" id="{097BAD3C-C3C5-47B7-82F9-6DD57F85D56E}"/>
+              </a:ext>
+            </a:extLst>
+          </p:cNvPr>
+          <p:cNvSpPr/>
+          <p:nvPr/>
+        </p:nvSpPr>
+        <p:spPr>
+          <a:xfrm>
+            <a:off x="8196678" y="3785897"/>
+            <a:ext cx="1710931" cy="501522"/>
+          </a:xfrm>
+          <a:prstGeom prst="rect">
+            <a:avLst/>
+          </a:prstGeom>
+          <a:ln/>
+        </p:spPr>
+        <p:style>
+          <a:lnRef idx="1">
+            <a:schemeClr val="accent2"/>
+          </a:lnRef>
+          <a:fillRef idx="2">
+            <a:schemeClr val="accent2"/>
+          </a:fillRef>
+          <a:effectRef idx="1">
+            <a:schemeClr val="accent2"/>
+          </a:effectRef>
+          <a:fontRef idx="minor">
+            <a:schemeClr val="dk1"/>
+          </a:fontRef>
+        </p:style>
+        <p:txBody>
+          <a:bodyPr rtlCol="0" anchor="ctr"/>
+          <a:lstStyle/>
+          <a:p>
+            <a:pPr algn="ctr"/>
+            <a:r>
+              <a:rPr lang="en-US" dirty="0"/>
+              <a:t>CARS</a:t>
+            </a:r>
+          </a:p>
+        </p:txBody>
+      </p:sp>
+      <p:cxnSp>
+        <p:nvCxnSpPr>
+          <p:cNvPr id="22" name="Straight Arrow Connector 21">
+            <a:extLst>
+              <a:ext uri="{FF2B5EF4-FFF2-40B4-BE49-F238E27FC236}">
+                <a16:creationId xmlns:a16="http://schemas.microsoft.com/office/drawing/2014/main" id="{2BA56F37-502B-4ED7-9B32-4DB6DC155C75}"/>
+              </a:ext>
+            </a:extLst>
+          </p:cNvPr>
+          <p:cNvCxnSpPr>
+            <a:cxnSpLocks/>
+          </p:cNvCxnSpPr>
+          <p:nvPr/>
+        </p:nvCxnSpPr>
+        <p:spPr>
+          <a:xfrm flipH="1">
+            <a:off x="6240362" y="2875384"/>
+            <a:ext cx="1787077" cy="443204"/>
+          </a:xfrm>
+          <a:prstGeom prst="straightConnector1">
+            <a:avLst/>
+          </a:prstGeom>
+          <a:ln>
+            <a:tailEnd type="triangle"/>
+          </a:ln>
+        </p:spPr>
+        <p:style>
+          <a:lnRef idx="1">
+            <a:schemeClr val="dk1"/>
+          </a:lnRef>
+          <a:fillRef idx="0">
+            <a:schemeClr val="dk1"/>
+          </a:fillRef>
+          <a:effectRef idx="0">
+            <a:schemeClr val="dk1"/>
+          </a:effectRef>
+          <a:fontRef idx="minor">
+            <a:schemeClr val="tx1"/>
+          </a:fontRef>
+        </p:style>
+      </p:cxnSp>
+      <p:cxnSp>
+        <p:nvCxnSpPr>
+          <p:cNvPr id="23" name="Straight Arrow Connector 22">
+            <a:extLst>
+              <a:ext uri="{FF2B5EF4-FFF2-40B4-BE49-F238E27FC236}">
+                <a16:creationId xmlns:a16="http://schemas.microsoft.com/office/drawing/2014/main" id="{68AC8575-54F7-4925-8229-8C07CAFABB42}"/>
+              </a:ext>
+            </a:extLst>
+          </p:cNvPr>
+          <p:cNvCxnSpPr>
+            <a:cxnSpLocks/>
+          </p:cNvCxnSpPr>
+          <p:nvPr/>
+        </p:nvCxnSpPr>
+        <p:spPr>
+          <a:xfrm flipH="1">
+            <a:off x="6261600" y="3386234"/>
+            <a:ext cx="1765839" cy="23716"/>
+          </a:xfrm>
+          <a:prstGeom prst="straightConnector1">
+            <a:avLst/>
+          </a:prstGeom>
+          <a:ln>
+            <a:tailEnd type="triangle"/>
+          </a:ln>
+        </p:spPr>
+        <p:style>
+          <a:lnRef idx="1">
+            <a:schemeClr val="dk1"/>
+          </a:lnRef>
+          <a:fillRef idx="0">
+            <a:schemeClr val="dk1"/>
+          </a:fillRef>
+          <a:effectRef idx="0">
+            <a:schemeClr val="dk1"/>
+          </a:effectRef>
+          <a:fontRef idx="minor">
+            <a:schemeClr val="tx1"/>
+          </a:fontRef>
+        </p:style>
+      </p:cxnSp>
+      <p:cxnSp>
+        <p:nvCxnSpPr>
+          <p:cNvPr id="24" name="Straight Arrow Connector 23">
+            <a:extLst>
+              <a:ext uri="{FF2B5EF4-FFF2-40B4-BE49-F238E27FC236}">
+                <a16:creationId xmlns:a16="http://schemas.microsoft.com/office/drawing/2014/main" id="{04E91A0A-1D22-4DB7-BDAA-59C12C91D694}"/>
+              </a:ext>
+            </a:extLst>
+          </p:cNvPr>
+          <p:cNvCxnSpPr>
+            <a:cxnSpLocks/>
+          </p:cNvCxnSpPr>
+          <p:nvPr/>
+        </p:nvCxnSpPr>
+        <p:spPr>
+          <a:xfrm flipH="1" flipV="1">
+            <a:off x="6261600" y="3545243"/>
+            <a:ext cx="1765840" cy="466923"/>
+          </a:xfrm>
+          <a:prstGeom prst="straightConnector1">
+            <a:avLst/>
+          </a:prstGeom>
+          <a:ln>
+            <a:tailEnd type="triangle"/>
+          </a:ln>
+        </p:spPr>
+        <p:style>
+          <a:lnRef idx="1">
+            <a:schemeClr val="dk1"/>
+          </a:lnRef>
+          <a:fillRef idx="0">
+            <a:schemeClr val="dk1"/>
+          </a:fillRef>
+          <a:effectRef idx="0">
+            <a:schemeClr val="dk1"/>
+          </a:effectRef>
+          <a:fontRef idx="minor">
+            <a:schemeClr val="tx1"/>
+          </a:fontRef>
+        </p:style>
+      </p:cxnSp>
+    </p:spTree>
+    <p:extLst>
+      <p:ext uri="{BB962C8B-B14F-4D97-AF65-F5344CB8AC3E}">
+        <p14:creationId xmlns:p14="http://schemas.microsoft.com/office/powerpoint/2010/main" val="2651221222"/>
+      </p:ext>
+    </p:extLst>
+  </p:cSld>
+  <p:clrMapOvr>
+    <a:masterClrMapping/>
+  </p:clrMapOvr>
+</p:sld>
+</file>
+
+<file path=ppt/slides/slide9.xml><?xml version="1.0" encoding="utf-8"?>
+<p:sld xmlns:a="http://schemas.openxmlformats.org/drawingml/2006/main" xmlns:r="http://schemas.openxmlformats.org/officeDocument/2006/relationships" xmlns:p="http://schemas.openxmlformats.org/presentationml/2006/main">
+  <p:cSld>
+    <p:spTree>
+      <p:nvGrpSpPr>
+        <p:cNvPr id="1" name=""/>
+        <p:cNvGrpSpPr/>
+        <p:nvPr/>
+      </p:nvGrpSpPr>
+      <p:grpSpPr>
+        <a:xfrm>
+          <a:off x="0" y="0"/>
+          <a:ext cx="0" cy="0"/>
+          <a:chOff x="0" y="0"/>
+          <a:chExt cx="0" cy="0"/>
+        </a:xfrm>
+      </p:grpSpPr>
+      <p:sp>
+        <p:nvSpPr>
+          <p:cNvPr id="4" name="TextBox 3">
+            <a:extLst>
+              <a:ext uri="{FF2B5EF4-FFF2-40B4-BE49-F238E27FC236}">
+                <a16:creationId xmlns:a16="http://schemas.microsoft.com/office/drawing/2014/main" id="{89F9381B-E906-4A95-9C09-8E1149D98BFB}"/>
+              </a:ext>
+            </a:extLst>
+          </p:cNvPr>
+          <p:cNvSpPr txBox="1"/>
+          <p:nvPr/>
+        </p:nvSpPr>
+        <p:spPr>
+          <a:xfrm>
+            <a:off x="466531" y="559837"/>
+            <a:ext cx="2207336" cy="369332"/>
+          </a:xfrm>
+          <a:prstGeom prst="rect">
+            <a:avLst/>
+          </a:prstGeom>
+          <a:noFill/>
+        </p:spPr>
+        <p:txBody>
+          <a:bodyPr wrap="none" rtlCol="0">
+            <a:spAutoFit/>
+          </a:bodyPr>
+          <a:lstStyle/>
+          <a:p>
+            <a:r>
+              <a:rPr lang="en-US" dirty="0"/>
+              <a:t>End Point per Caller 2</a:t>
+            </a:r>
+          </a:p>
+        </p:txBody>
+      </p:sp>
+      <p:sp>
+        <p:nvSpPr>
+          <p:cNvPr id="17" name="Isosceles Triangle 16">
+            <a:extLst>
+              <a:ext uri="{FF2B5EF4-FFF2-40B4-BE49-F238E27FC236}">
+                <a16:creationId xmlns:a16="http://schemas.microsoft.com/office/drawing/2014/main" id="{213796AE-41C2-4B8C-8203-7D62167C8D96}"/>
+              </a:ext>
+            </a:extLst>
+          </p:cNvPr>
+          <p:cNvSpPr/>
+          <p:nvPr/>
+        </p:nvSpPr>
+        <p:spPr>
+          <a:xfrm>
+            <a:off x="4005942" y="3010677"/>
+            <a:ext cx="2837795" cy="1959429"/>
+          </a:xfrm>
+          <a:prstGeom prst="triangle">
+            <a:avLst/>
+          </a:prstGeom>
+        </p:spPr>
+        <p:style>
+          <a:lnRef idx="1">
+            <a:schemeClr val="accent3"/>
+          </a:lnRef>
+          <a:fillRef idx="2">
+            <a:schemeClr val="accent3"/>
+          </a:fillRef>
+          <a:effectRef idx="1">
+            <a:schemeClr val="accent3"/>
+          </a:effectRef>
+          <a:fontRef idx="minor">
+            <a:schemeClr val="dk1"/>
+          </a:fontRef>
+        </p:style>
+        <p:txBody>
+          <a:bodyPr rtlCol="0" anchor="ctr"/>
+          <a:lstStyle/>
+          <a:p>
+            <a:pPr algn="ctr"/>
+            <a:r>
+              <a:rPr lang="en-US" dirty="0"/>
+              <a:t>Returns </a:t>
+            </a:r>
+            <a:r>
+              <a:rPr lang="en-US" dirty="0" err="1"/>
+              <a:t>Calc</a:t>
+            </a:r>
+            <a:endParaRPr lang="en-US" dirty="0"/>
+          </a:p>
+        </p:txBody>
+      </p:sp>
+      <p:sp>
+        <p:nvSpPr>
+          <p:cNvPr id="18" name="Arrow: Right 17">
+            <a:extLst>
+              <a:ext uri="{FF2B5EF4-FFF2-40B4-BE49-F238E27FC236}">
+                <a16:creationId xmlns:a16="http://schemas.microsoft.com/office/drawing/2014/main" id="{5E098D36-B593-4BF7-93DE-E0D9920EB8F6}"/>
+              </a:ext>
+            </a:extLst>
+          </p:cNvPr>
+          <p:cNvSpPr/>
+          <p:nvPr/>
+        </p:nvSpPr>
+        <p:spPr>
+          <a:xfrm>
+            <a:off x="5685455" y="3318588"/>
+            <a:ext cx="457200" cy="214604"/>
+          </a:xfrm>
+          <a:prstGeom prst="rightArrow">
+            <a:avLst/>
+          </a:prstGeom>
+        </p:spPr>
+        <p:style>
+          <a:lnRef idx="3">
+            <a:schemeClr val="lt1"/>
+          </a:lnRef>
+          <a:fillRef idx="1">
+            <a:schemeClr val="dk1"/>
+          </a:fillRef>
+          <a:effectRef idx="1">
+            <a:schemeClr val="dk1"/>
+          </a:effectRef>
+          <a:fontRef idx="minor">
+            <a:schemeClr val="lt1"/>
+          </a:fontRef>
+        </p:style>
+        <p:txBody>
+          <a:bodyPr rtlCol="0" anchor="ctr"/>
+          <a:lstStyle/>
+          <a:p>
+            <a:pPr algn="ctr"/>
+            <a:endParaRPr lang="en-US"/>
+          </a:p>
+        </p:txBody>
+      </p:sp>
+      <p:sp>
+        <p:nvSpPr>
+          <p:cNvPr id="15" name="Rectangle 14">
+            <a:extLst>
+              <a:ext uri="{FF2B5EF4-FFF2-40B4-BE49-F238E27FC236}">
+                <a16:creationId xmlns:a16="http://schemas.microsoft.com/office/drawing/2014/main" id="{2889C6CD-D751-4444-ABD7-4A017E89426D}"/>
+              </a:ext>
+            </a:extLst>
+          </p:cNvPr>
+          <p:cNvSpPr/>
+          <p:nvPr/>
+        </p:nvSpPr>
+        <p:spPr>
+          <a:xfrm>
+            <a:off x="8196678" y="2596241"/>
+            <a:ext cx="1710931" cy="501522"/>
+          </a:xfrm>
+          <a:prstGeom prst="rect">
+            <a:avLst/>
+          </a:prstGeom>
+          <a:ln/>
+        </p:spPr>
+        <p:style>
+          <a:lnRef idx="1">
+            <a:schemeClr val="accent2"/>
+          </a:lnRef>
+          <a:fillRef idx="2">
+            <a:schemeClr val="accent2"/>
+          </a:fillRef>
+          <a:effectRef idx="1">
+            <a:schemeClr val="accent2"/>
+          </a:effectRef>
+          <a:fontRef idx="minor">
+            <a:schemeClr val="dk1"/>
+          </a:fontRef>
+        </p:style>
+        <p:txBody>
+          <a:bodyPr rtlCol="0" anchor="ctr"/>
+          <a:lstStyle/>
+          <a:p>
+            <a:pPr algn="ctr"/>
+            <a:r>
+              <a:rPr lang="en-US" dirty="0"/>
+              <a:t>Report Center</a:t>
+            </a:r>
+          </a:p>
+        </p:txBody>
+      </p:sp>
+      <p:sp>
+        <p:nvSpPr>
+          <p:cNvPr id="16" name="Rectangle 15">
+            <a:extLst>
+              <a:ext uri="{FF2B5EF4-FFF2-40B4-BE49-F238E27FC236}">
+                <a16:creationId xmlns:a16="http://schemas.microsoft.com/office/drawing/2014/main" id="{75060587-DF65-46C3-ABAB-126CA1091DD0}"/>
+              </a:ext>
+            </a:extLst>
+          </p:cNvPr>
+          <p:cNvSpPr/>
+          <p:nvPr/>
+        </p:nvSpPr>
+        <p:spPr>
+          <a:xfrm>
+            <a:off x="8196678" y="3191069"/>
+            <a:ext cx="1710931" cy="501522"/>
+          </a:xfrm>
+          <a:prstGeom prst="rect">
+            <a:avLst/>
+          </a:prstGeom>
+          <a:ln/>
+        </p:spPr>
+        <p:style>
+          <a:lnRef idx="1">
+            <a:schemeClr val="accent2"/>
+          </a:lnRef>
+          <a:fillRef idx="2">
+            <a:schemeClr val="accent2"/>
+          </a:fillRef>
+          <a:effectRef idx="1">
+            <a:schemeClr val="accent2"/>
+          </a:effectRef>
+          <a:fontRef idx="minor">
+            <a:schemeClr val="dk1"/>
+          </a:fontRef>
+        </p:style>
+        <p:txBody>
+          <a:bodyPr rtlCol="0" anchor="ctr"/>
+          <a:lstStyle/>
+          <a:p>
+            <a:pPr algn="ctr"/>
+            <a:r>
+              <a:rPr lang="en-US" dirty="0"/>
+              <a:t>GIPS</a:t>
+            </a:r>
+          </a:p>
+        </p:txBody>
+      </p:sp>
+      <p:sp>
+        <p:nvSpPr>
+          <p:cNvPr id="21" name="Rectangle 20">
+            <a:extLst>
+              <a:ext uri="{FF2B5EF4-FFF2-40B4-BE49-F238E27FC236}">
+                <a16:creationId xmlns:a16="http://schemas.microsoft.com/office/drawing/2014/main" id="{097BAD3C-C3C5-47B7-82F9-6DD57F85D56E}"/>
+              </a:ext>
+            </a:extLst>
+          </p:cNvPr>
+          <p:cNvSpPr/>
+          <p:nvPr/>
+        </p:nvSpPr>
+        <p:spPr>
+          <a:xfrm>
+            <a:off x="8196678" y="3785897"/>
+            <a:ext cx="1710931" cy="501522"/>
+          </a:xfrm>
+          <a:prstGeom prst="rect">
+            <a:avLst/>
+          </a:prstGeom>
+          <a:ln/>
+        </p:spPr>
+        <p:style>
+          <a:lnRef idx="1">
+            <a:schemeClr val="accent2"/>
+          </a:lnRef>
+          <a:fillRef idx="2">
+            <a:schemeClr val="accent2"/>
+          </a:fillRef>
+          <a:effectRef idx="1">
+            <a:schemeClr val="accent2"/>
+          </a:effectRef>
+          <a:fontRef idx="minor">
+            <a:schemeClr val="dk1"/>
+          </a:fontRef>
+        </p:style>
+        <p:txBody>
+          <a:bodyPr rtlCol="0" anchor="ctr"/>
+          <a:lstStyle/>
+          <a:p>
+            <a:pPr algn="ctr"/>
+            <a:r>
+              <a:rPr lang="en-US" dirty="0"/>
+              <a:t>CARS</a:t>
+            </a:r>
+          </a:p>
+        </p:txBody>
+      </p:sp>
+      <p:cxnSp>
+        <p:nvCxnSpPr>
+          <p:cNvPr id="22" name="Straight Arrow Connector 21">
+            <a:extLst>
+              <a:ext uri="{FF2B5EF4-FFF2-40B4-BE49-F238E27FC236}">
+                <a16:creationId xmlns:a16="http://schemas.microsoft.com/office/drawing/2014/main" id="{2BA56F37-502B-4ED7-9B32-4DB6DC155C75}"/>
+              </a:ext>
+            </a:extLst>
+          </p:cNvPr>
+          <p:cNvCxnSpPr>
+            <a:cxnSpLocks/>
+          </p:cNvCxnSpPr>
+          <p:nvPr/>
+        </p:nvCxnSpPr>
+        <p:spPr>
+          <a:xfrm flipH="1">
+            <a:off x="6261600" y="2875384"/>
+            <a:ext cx="1765840" cy="500548"/>
+          </a:xfrm>
+          <a:prstGeom prst="straightConnector1">
+            <a:avLst/>
+          </a:prstGeom>
+          <a:ln>
+            <a:tailEnd type="triangle"/>
+          </a:ln>
+        </p:spPr>
+        <p:style>
+          <a:lnRef idx="1">
+            <a:schemeClr val="dk1"/>
+          </a:lnRef>
+          <a:fillRef idx="0">
+            <a:schemeClr val="dk1"/>
+          </a:fillRef>
+          <a:effectRef idx="0">
+            <a:schemeClr val="dk1"/>
+          </a:effectRef>
+          <a:fontRef idx="minor">
+            <a:schemeClr val="tx1"/>
+          </a:fontRef>
+        </p:style>
+      </p:cxnSp>
+      <p:cxnSp>
+        <p:nvCxnSpPr>
+          <p:cNvPr id="23" name="Straight Arrow Connector 22">
+            <a:extLst>
+              <a:ext uri="{FF2B5EF4-FFF2-40B4-BE49-F238E27FC236}">
+                <a16:creationId xmlns:a16="http://schemas.microsoft.com/office/drawing/2014/main" id="{68AC8575-54F7-4925-8229-8C07CAFABB42}"/>
+              </a:ext>
+            </a:extLst>
+          </p:cNvPr>
+          <p:cNvCxnSpPr>
+            <a:cxnSpLocks/>
+          </p:cNvCxnSpPr>
+          <p:nvPr/>
+        </p:nvCxnSpPr>
+        <p:spPr>
+          <a:xfrm flipH="1">
+            <a:off x="6371628" y="3386234"/>
+            <a:ext cx="1655813" cy="345039"/>
+          </a:xfrm>
+          <a:prstGeom prst="straightConnector1">
+            <a:avLst/>
+          </a:prstGeom>
+          <a:ln>
+            <a:tailEnd type="triangle"/>
+          </a:ln>
+        </p:spPr>
+        <p:style>
+          <a:lnRef idx="1">
+            <a:schemeClr val="dk1"/>
+          </a:lnRef>
+          <a:fillRef idx="0">
+            <a:schemeClr val="dk1"/>
+          </a:fillRef>
+          <a:effectRef idx="0">
+            <a:schemeClr val="dk1"/>
+          </a:effectRef>
+          <a:fontRef idx="minor">
+            <a:schemeClr val="tx1"/>
+          </a:fontRef>
+        </p:style>
+      </p:cxnSp>
+      <p:cxnSp>
+        <p:nvCxnSpPr>
+          <p:cNvPr id="24" name="Straight Arrow Connector 23">
+            <a:extLst>
+              <a:ext uri="{FF2B5EF4-FFF2-40B4-BE49-F238E27FC236}">
+                <a16:creationId xmlns:a16="http://schemas.microsoft.com/office/drawing/2014/main" id="{04E91A0A-1D22-4DB7-BDAA-59C12C91D694}"/>
+              </a:ext>
+            </a:extLst>
+          </p:cNvPr>
+          <p:cNvCxnSpPr>
+            <a:cxnSpLocks/>
+          </p:cNvCxnSpPr>
+          <p:nvPr/>
+        </p:nvCxnSpPr>
+        <p:spPr>
+          <a:xfrm flipH="1">
+            <a:off x="6568751" y="4012167"/>
+            <a:ext cx="1458689" cy="85526"/>
+          </a:xfrm>
+          <a:prstGeom prst="straightConnector1">
+            <a:avLst/>
+          </a:prstGeom>
+          <a:ln>
+            <a:tailEnd type="triangle"/>
+          </a:ln>
+        </p:spPr>
+        <p:style>
+          <a:lnRef idx="1">
+            <a:schemeClr val="dk1"/>
+          </a:lnRef>
+          <a:fillRef idx="0">
+            <a:schemeClr val="dk1"/>
+          </a:fillRef>
+          <a:effectRef idx="0">
+            <a:schemeClr val="dk1"/>
+          </a:effectRef>
+          <a:fontRef idx="minor">
+            <a:schemeClr val="tx1"/>
+          </a:fontRef>
+        </p:style>
+      </p:cxnSp>
+      <p:sp>
+        <p:nvSpPr>
+          <p:cNvPr id="11" name="Arrow: Right 10">
+            <a:extLst>
+              <a:ext uri="{FF2B5EF4-FFF2-40B4-BE49-F238E27FC236}">
+                <a16:creationId xmlns:a16="http://schemas.microsoft.com/office/drawing/2014/main" id="{DCCED625-3694-4E51-8E32-BEBD270CD9E9}"/>
+              </a:ext>
+            </a:extLst>
+          </p:cNvPr>
+          <p:cNvSpPr/>
+          <p:nvPr/>
+        </p:nvSpPr>
+        <p:spPr>
+          <a:xfrm>
+            <a:off x="5841724" y="3661875"/>
+            <a:ext cx="457200" cy="214604"/>
+          </a:xfrm>
+          <a:prstGeom prst="rightArrow">
+            <a:avLst/>
+          </a:prstGeom>
+        </p:spPr>
+        <p:style>
+          <a:lnRef idx="3">
+            <a:schemeClr val="lt1"/>
+          </a:lnRef>
+          <a:fillRef idx="1">
+            <a:schemeClr val="dk1"/>
+          </a:fillRef>
+          <a:effectRef idx="1">
+            <a:schemeClr val="dk1"/>
+          </a:effectRef>
+          <a:fontRef idx="minor">
+            <a:schemeClr val="lt1"/>
+          </a:fontRef>
+        </p:style>
+        <p:txBody>
+          <a:bodyPr rtlCol="0" anchor="ctr"/>
+          <a:lstStyle/>
+          <a:p>
+            <a:pPr algn="ctr"/>
+            <a:endParaRPr lang="en-US"/>
+          </a:p>
+        </p:txBody>
+      </p:sp>
+      <p:sp>
+        <p:nvSpPr>
+          <p:cNvPr id="12" name="Arrow: Right 11">
+            <a:extLst>
+              <a:ext uri="{FF2B5EF4-FFF2-40B4-BE49-F238E27FC236}">
+                <a16:creationId xmlns:a16="http://schemas.microsoft.com/office/drawing/2014/main" id="{0E575EE0-021D-419E-91FA-23514F80DD12}"/>
+              </a:ext>
+            </a:extLst>
+          </p:cNvPr>
+          <p:cNvSpPr/>
+          <p:nvPr/>
+        </p:nvSpPr>
+        <p:spPr>
+          <a:xfrm>
+            <a:off x="6033000" y="3990391"/>
+            <a:ext cx="457200" cy="214604"/>
+          </a:xfrm>
+          <a:prstGeom prst="rightArrow">
+            <a:avLst/>
+          </a:prstGeom>
+        </p:spPr>
+        <p:style>
+          <a:lnRef idx="3">
+            <a:schemeClr val="lt1"/>
+          </a:lnRef>
+          <a:fillRef idx="1">
+            <a:schemeClr val="dk1"/>
+          </a:fillRef>
+          <a:effectRef idx="1">
+            <a:schemeClr val="dk1"/>
+          </a:effectRef>
+          <a:fontRef idx="minor">
+            <a:schemeClr val="lt1"/>
+          </a:fontRef>
+        </p:style>
+        <p:txBody>
+          <a:bodyPr rtlCol="0" anchor="ctr"/>
+          <a:lstStyle/>
+          <a:p>
+            <a:pPr algn="ctr"/>
+            <a:endParaRPr lang="en-US"/>
+          </a:p>
+        </p:txBody>
+      </p:sp>
+    </p:spTree>
+    <p:extLst>
+      <p:ext uri="{BB962C8B-B14F-4D97-AF65-F5344CB8AC3E}">
+        <p14:creationId xmlns:p14="http://schemas.microsoft.com/office/powerpoint/2010/main" val="2376887105"/>
+      </p:ext>
+    </p:extLst>
+  </p:cSld>
+  <p:clrMapOvr>
+    <a:masterClrMapping/>
+  </p:clrMapOvr>
+</p:sld>
+</file>
+
 <file path=ppt/theme/theme1.xml><?xml version="1.0" encoding="utf-8"?>
 <a:theme xmlns:a="http://schemas.openxmlformats.org/drawingml/2006/main" name="Office Theme">
   <a:themeElements>

</xml_diff>